<commit_message>
add animated show show-asymptotic-notation, show-asymptotic-properties
</commit_message>
<xml_diff>
--- a/spring12/slidesS12/asymptotic-properties.pptx
+++ b/spring12/slidesS12/asymptotic-properties.pptx
@@ -3425,6 +3425,14 @@
   <p:clrMapOvr>
     <a:masterClrMapping/>
   </p:clrMapOvr>
+  <mc:AlternateContent xmlns:mc="http://schemas.openxmlformats.org/markup-compatibility/2006">
+    <mc:Choice xmlns:p14="http://schemas.microsoft.com/office/powerpoint/2010/main" Requires="p14">
+      <p:transition spd="slow" p14:dur="2000" advTm="4424"/>
+    </mc:Choice>
+    <mc:Fallback>
+      <p:transition xmlns:p14="http://schemas.microsoft.com/office/powerpoint/2010/main" spd="slow" advTm="4424"/>
+    </mc:Fallback>
+  </mc:AlternateContent>
   <p:timing>
     <p:tnLst>
       <p:par>
@@ -3571,7 +3579,7 @@
   <p:clrMapOvr>
     <a:masterClrMapping/>
   </p:clrMapOvr>
-  <p:transition xmlns:p14="http://schemas.microsoft.com/office/powerpoint/2010/main">
+  <p:transition xmlns:p14="http://schemas.microsoft.com/office/powerpoint/2010/main" advTm="2727">
     <p:fade thruBlk="1"/>
   </p:transition>
   <p:timing>
@@ -4027,11 +4035,14 @@
         </p:txBody>
       </p:sp>
     </p:spTree>
+    <p:custDataLst>
+      <p:tags r:id="rId1"/>
+    </p:custDataLst>
   </p:cSld>
   <p:clrMapOvr>
     <a:masterClrMapping/>
   </p:clrMapOvr>
-  <p:transition xmlns:p14="http://schemas.microsoft.com/office/powerpoint/2010/main" spd="slow">
+  <p:transition xmlns:p14="http://schemas.microsoft.com/office/powerpoint/2010/main" spd="slow" advTm="12063">
     <p:fade thruBlk="1"/>
   </p:transition>
   <p:timing>
@@ -5792,11 +5803,14 @@
         </p:txBody>
       </p:sp>
     </p:spTree>
+    <p:custDataLst>
+      <p:tags r:id="rId1"/>
+    </p:custDataLst>
   </p:cSld>
   <p:clrMapOvr>
     <a:masterClrMapping/>
   </p:clrMapOvr>
-  <p:transition xmlns:p14="http://schemas.microsoft.com/office/powerpoint/2010/main">
+  <p:transition xmlns:p14="http://schemas.microsoft.com/office/powerpoint/2010/main" advTm="23714">
     <p:fade/>
   </p:transition>
   <p:timing>
@@ -6176,7 +6190,7 @@
         <p:spPr>
           <a:xfrm>
             <a:off x="76200" y="914400"/>
-            <a:ext cx="8690159" cy="4247317"/>
+            <a:ext cx="8866242" cy="4247317"/>
           </a:xfrm>
           <a:prstGeom prst="rect">
             <a:avLst/>
@@ -6296,24 +6310,46 @@
             <a:r>
               <a:rPr lang="en-US" sz="5400" dirty="0" smtClean="0">
                 <a:solidFill>
-                  <a:srgbClr val="0000FF"/>
+                  <a:srgbClr val="000000"/>
                 </a:solidFill>
                 <a:latin typeface="Comic Sans MS"/>
                 <a:cs typeface="Comic Sans MS"/>
                 <a:sym typeface="Symbol" pitchFamily="18" charset="2"/>
               </a:rPr>
-              <a:t>f(n)/g(n)</a:t>
+              <a:t>maybe </a:t>
             </a:r>
             <a:r>
               <a:rPr lang="en-US" sz="5400" dirty="0" smtClean="0">
                 <a:solidFill>
-                  <a:srgbClr val="000000"/>
+                  <a:srgbClr val="0000FF"/>
                 </a:solidFill>
                 <a:latin typeface="Comic Sans MS"/>
                 <a:cs typeface="Comic Sans MS"/>
                 <a:sym typeface="Symbol" pitchFamily="18" charset="2"/>
               </a:rPr>
-              <a:t> has no limit.</a:t>
+              <a:t>f/g</a:t>
+            </a:r>
+            <a:r>
+              <a:rPr lang="en-US" sz="5400" dirty="0" smtClean="0">
+                <a:solidFill>
+                  <a:srgbClr val="000000"/>
+                </a:solidFill>
+                <a:latin typeface="Comic Sans MS"/>
+                <a:cs typeface="Comic Sans MS"/>
+                <a:sym typeface="Symbol" pitchFamily="18" charset="2"/>
+              </a:rPr>
+              <a:t> </a:t>
+            </a:r>
+            <a:r>
+              <a:rPr lang="en-US" sz="5400" dirty="0" smtClean="0">
+                <a:solidFill>
+                  <a:srgbClr val="000000"/>
+                </a:solidFill>
+                <a:latin typeface="Comic Sans MS"/>
+                <a:cs typeface="Comic Sans MS"/>
+                <a:sym typeface="Symbol" pitchFamily="18" charset="2"/>
+              </a:rPr>
+              <a:t>has no limit.</a:t>
             </a:r>
           </a:p>
           <a:p>
@@ -6393,12 +6429,12 @@
           <a:graphicData uri="http://schemas.openxmlformats.org/presentationml/2006/ole">
             <mc:AlternateContent xmlns:mc="http://schemas.openxmlformats.org/markup-compatibility/2006">
               <mc:Choice xmlns:v="urn:schemas-microsoft-com:vml" Requires="v">
-                <p:oleObj spid="_x0000_s1038" name="Equation" r:id="rId4" imgW="1333500" imgH="508000" progId="Equation.DSMT4">
+                <p:oleObj spid="_x0000_s1053" name="Equation" r:id="rId5" imgW="1333500" imgH="508000" progId="Equation.DSMT4">
                   <p:embed/>
                 </p:oleObj>
               </mc:Choice>
               <mc:Fallback>
-                <p:oleObj name="Equation" r:id="rId4" imgW="1333500" imgH="508000" progId="Equation.DSMT4">
+                <p:oleObj name="Equation" r:id="rId5" imgW="1333500" imgH="508000" progId="Equation.DSMT4">
                   <p:embed/>
                   <p:pic>
                     <p:nvPicPr>
@@ -6407,7 +6443,7 @@
                       <p:nvPr/>
                     </p:nvPicPr>
                     <p:blipFill>
-                      <a:blip r:embed="rId5"/>
+                      <a:blip r:embed="rId6"/>
                       <a:stretch>
                         <a:fillRect/>
                       </a:stretch>
@@ -6450,12 +6486,12 @@
           <a:graphicData uri="http://schemas.openxmlformats.org/presentationml/2006/ole">
             <mc:AlternateContent xmlns:mc="http://schemas.openxmlformats.org/markup-compatibility/2006">
               <mc:Choice xmlns:v="urn:schemas-microsoft-com:vml" Requires="v">
-                <p:oleObj spid="_x0000_s1039" name="Equation" r:id="rId6" imgW="1803400" imgH="558800" progId="Equation.DSMT4">
+                <p:oleObj spid="_x0000_s1054" name="Equation" r:id="rId7" imgW="1803400" imgH="558800" progId="Equation.DSMT4">
                   <p:embed/>
                 </p:oleObj>
               </mc:Choice>
               <mc:Fallback>
-                <p:oleObj name="Equation" r:id="rId6" imgW="1803400" imgH="558800" progId="Equation.DSMT4">
+                <p:oleObj name="Equation" r:id="rId7" imgW="1803400" imgH="558800" progId="Equation.DSMT4">
                   <p:embed/>
                   <p:pic>
                     <p:nvPicPr>
@@ -6464,7 +6500,7 @@
                       <p:nvPr/>
                     </p:nvPicPr>
                     <p:blipFill>
-                      <a:blip r:embed="rId7"/>
+                      <a:blip r:embed="rId8"/>
                       <a:stretch>
                         <a:fillRect/>
                       </a:stretch>
@@ -6486,6 +6522,9 @@
         </a:graphic>
       </p:graphicFrame>
     </p:spTree>
+    <p:custDataLst>
+      <p:tags r:id="rId2"/>
+    </p:custDataLst>
     <p:extLst>
       <p:ext uri="{BB962C8B-B14F-4D97-AF65-F5344CB8AC3E}">
         <p14:creationId xmlns:p14="http://schemas.microsoft.com/office/powerpoint/2010/main" val="3489784058"/>
@@ -6495,7 +6534,7 @@
   <p:clrMapOvr>
     <a:masterClrMapping/>
   </p:clrMapOvr>
-  <p:transition xmlns:p14="http://schemas.microsoft.com/office/powerpoint/2010/main" spd="slow">
+  <p:transition xmlns:p14="http://schemas.microsoft.com/office/powerpoint/2010/main" spd="slow" advTm="27544">
     <p:fade thruBlk="1"/>
   </p:transition>
   <p:timing>
@@ -7361,11 +7400,14 @@
         </p:txBody>
       </p:sp>
     </p:spTree>
+    <p:custDataLst>
+      <p:tags r:id="rId1"/>
+    </p:custDataLst>
   </p:cSld>
   <p:clrMapOvr>
     <a:masterClrMapping/>
   </p:clrMapOvr>
-  <p:transition xmlns:p14="http://schemas.microsoft.com/office/powerpoint/2010/main">
+  <p:transition xmlns:p14="http://schemas.microsoft.com/office/powerpoint/2010/main" advTm="20397">
     <p:fade/>
   </p:transition>
   <p:timing>
@@ -8611,12 +8653,12 @@
             <a:graphicData uri="http://schemas.openxmlformats.org/presentationml/2006/ole">
               <mc:AlternateContent xmlns:mc="http://schemas.openxmlformats.org/markup-compatibility/2006">
                 <mc:Choice xmlns:v="urn:schemas-microsoft-com:vml" Requires="v">
-                  <p:oleObj spid="_x0000_s157761" name="Equation" r:id="rId4" imgW="152280" imgH="419040" progId="Equation.DSMT4">
+                  <p:oleObj spid="_x0000_s157774" name="Equation" r:id="rId5" imgW="152280" imgH="419040" progId="Equation.DSMT4">
                     <p:embed/>
                   </p:oleObj>
                 </mc:Choice>
                 <mc:Fallback>
-                  <p:oleObj name="Equation" r:id="rId4" imgW="152280" imgH="419040" progId="Equation.DSMT4">
+                  <p:oleObj name="Equation" r:id="rId5" imgW="152280" imgH="419040" progId="Equation.DSMT4">
                     <p:embed/>
                     <p:pic>
                       <p:nvPicPr>
@@ -8627,7 +8669,7 @@
                         <p:nvPr/>
                       </p:nvPicPr>
                       <p:blipFill>
-                        <a:blip r:embed="rId5">
+                        <a:blip r:embed="rId6">
                           <a:extLst>
                             <a:ext uri="{28A0092B-C50C-407E-A947-70E740481C1C}">
                               <a14:useLocalDpi xmlns:a14="http://schemas.microsoft.com/office/drawing/2010/main" val="0"/>
@@ -8795,12 +8837,12 @@
             <a:graphicData uri="http://schemas.openxmlformats.org/presentationml/2006/ole">
               <mc:AlternateContent xmlns:mc="http://schemas.openxmlformats.org/markup-compatibility/2006">
                 <mc:Choice xmlns:v="urn:schemas-microsoft-com:vml" Requires="v">
-                  <p:oleObj spid="_x0000_s157762" name="Equation" r:id="rId6" imgW="152280" imgH="444240" progId="Equation.DSMT4">
+                  <p:oleObj spid="_x0000_s157775" name="Equation" r:id="rId7" imgW="152280" imgH="444240" progId="Equation.DSMT4">
                     <p:embed/>
                   </p:oleObj>
                 </mc:Choice>
                 <mc:Fallback>
-                  <p:oleObj name="Equation" r:id="rId6" imgW="152280" imgH="444240" progId="Equation.DSMT4">
+                  <p:oleObj name="Equation" r:id="rId7" imgW="152280" imgH="444240" progId="Equation.DSMT4">
                     <p:embed/>
                     <p:pic>
                       <p:nvPicPr>
@@ -8811,7 +8853,7 @@
                         <p:nvPr/>
                       </p:nvPicPr>
                       <p:blipFill>
-                        <a:blip r:embed="rId7">
+                        <a:blip r:embed="rId8">
                           <a:extLst>
                             <a:ext uri="{28A0092B-C50C-407E-A947-70E740481C1C}">
                               <a14:useLocalDpi xmlns:a14="http://schemas.microsoft.com/office/drawing/2010/main" val="0"/>
@@ -8851,11 +8893,14 @@
         </p:graphicFrame>
       </p:grpSp>
     </p:spTree>
+    <p:custDataLst>
+      <p:tags r:id="rId2"/>
+    </p:custDataLst>
   </p:cSld>
   <p:clrMapOvr>
     <a:masterClrMapping/>
   </p:clrMapOvr>
-  <p:transition xmlns:p14="http://schemas.microsoft.com/office/powerpoint/2010/main">
+  <p:transition xmlns:p14="http://schemas.microsoft.com/office/powerpoint/2010/main" advTm="9623">
     <p:fade thruBlk="1"/>
   </p:transition>
   <p:timing>
@@ -9235,12 +9280,12 @@
           <a:graphicData uri="http://schemas.openxmlformats.org/presentationml/2006/ole">
             <mc:AlternateContent xmlns:mc="http://schemas.openxmlformats.org/markup-compatibility/2006">
               <mc:Choice xmlns:v="urn:schemas-microsoft-com:vml" Requires="v">
-                <p:oleObj spid="_x0000_s158787" name="Equation" r:id="rId4" imgW="685800" imgH="431800" progId="Equation.DSMT4">
+                <p:oleObj spid="_x0000_s158800" name="Equation" r:id="rId5" imgW="685800" imgH="431800" progId="Equation.DSMT4">
                   <p:embed/>
                 </p:oleObj>
               </mc:Choice>
               <mc:Fallback>
-                <p:oleObj name="Equation" r:id="rId4" imgW="685800" imgH="431800" progId="Equation.DSMT4">
+                <p:oleObj name="Equation" r:id="rId5" imgW="685800" imgH="431800" progId="Equation.DSMT4">
                   <p:embed/>
                   <p:pic>
                     <p:nvPicPr>
@@ -9251,7 +9296,7 @@
                       <p:nvPr/>
                     </p:nvPicPr>
                     <p:blipFill>
-                      <a:blip r:embed="rId5"/>
+                      <a:blip r:embed="rId6"/>
                       <a:srcRect/>
                       <a:stretch>
                         <a:fillRect/>
@@ -9476,12 +9521,12 @@
           <a:graphicData uri="http://schemas.openxmlformats.org/presentationml/2006/ole">
             <mc:AlternateContent xmlns:mc="http://schemas.openxmlformats.org/markup-compatibility/2006">
               <mc:Choice xmlns:v="urn:schemas-microsoft-com:vml" Requires="v">
-                <p:oleObj spid="_x0000_s158788" name="Equation" r:id="rId6" imgW="660400" imgH="419100" progId="Equation.DSMT4">
+                <p:oleObj spid="_x0000_s158801" name="Equation" r:id="rId7" imgW="660400" imgH="419100" progId="Equation.DSMT4">
                   <p:embed/>
                 </p:oleObj>
               </mc:Choice>
               <mc:Fallback>
-                <p:oleObj name="Equation" r:id="rId6" imgW="660400" imgH="419100" progId="Equation.DSMT4">
+                <p:oleObj name="Equation" r:id="rId7" imgW="660400" imgH="419100" progId="Equation.DSMT4">
                   <p:embed/>
                   <p:pic>
                     <p:nvPicPr>
@@ -9492,7 +9537,7 @@
                       <p:nvPr/>
                     </p:nvPicPr>
                     <p:blipFill>
-                      <a:blip r:embed="rId7"/>
+                      <a:blip r:embed="rId8"/>
                       <a:srcRect/>
                       <a:stretch>
                         <a:fillRect/>
@@ -9593,11 +9638,14 @@
         </p:txBody>
       </p:sp>
     </p:spTree>
+    <p:custDataLst>
+      <p:tags r:id="rId2"/>
+    </p:custDataLst>
   </p:cSld>
   <p:clrMapOvr>
     <a:masterClrMapping/>
   </p:clrMapOvr>
-  <p:transition xmlns:p14="http://schemas.microsoft.com/office/powerpoint/2010/main">
+  <p:transition xmlns:p14="http://schemas.microsoft.com/office/powerpoint/2010/main" advTm="13101">
     <p:fade thruBlk="1"/>
   </p:transition>
   <p:timing>
@@ -10143,11 +10191,14 @@
         </p:txBody>
       </p:sp>
     </p:spTree>
+    <p:custDataLst>
+      <p:tags r:id="rId1"/>
+    </p:custDataLst>
   </p:cSld>
   <p:clrMapOvr>
     <a:masterClrMapping/>
   </p:clrMapOvr>
-  <p:transition xmlns:p14="http://schemas.microsoft.com/office/powerpoint/2010/main">
+  <p:transition xmlns:p14="http://schemas.microsoft.com/office/powerpoint/2010/main" advTm="5462">
     <p:fade/>
   </p:transition>
   <p:timing>
@@ -10509,12 +10560,12 @@
           <a:graphicData uri="http://schemas.openxmlformats.org/presentationml/2006/ole">
             <mc:AlternateContent xmlns:mc="http://schemas.openxmlformats.org/markup-compatibility/2006">
               <mc:Choice xmlns:v="urn:schemas-microsoft-com:vml" Requires="v">
-                <p:oleObj spid="_x0000_s159853" name="Equation" r:id="rId4" imgW="1003300" imgH="508000" progId="Equation.DSMT4">
+                <p:oleObj spid="_x0000_s159872" name="Equation" r:id="rId5" imgW="1003300" imgH="508000" progId="Equation.DSMT4">
                   <p:embed/>
                 </p:oleObj>
               </mc:Choice>
               <mc:Fallback>
-                <p:oleObj name="Equation" r:id="rId4" imgW="1003300" imgH="508000" progId="Equation.DSMT4">
+                <p:oleObj name="Equation" r:id="rId5" imgW="1003300" imgH="508000" progId="Equation.DSMT4">
                   <p:embed/>
                   <p:pic>
                     <p:nvPicPr>
@@ -10523,7 +10574,7 @@
                       <p:nvPr/>
                     </p:nvPicPr>
                     <p:blipFill>
-                      <a:blip r:embed="rId5"/>
+                      <a:blip r:embed="rId6"/>
                       <a:stretch>
                         <a:fillRect/>
                       </a:stretch>
@@ -10566,12 +10617,12 @@
           <a:graphicData uri="http://schemas.openxmlformats.org/presentationml/2006/ole">
             <mc:AlternateContent xmlns:mc="http://schemas.openxmlformats.org/markup-compatibility/2006">
               <mc:Choice xmlns:v="urn:schemas-microsoft-com:vml" Requires="v">
-                <p:oleObj spid="_x0000_s159854" name="Equation" r:id="rId6" imgW="1346200" imgH="508000" progId="Equation.DSMT4">
+                <p:oleObj spid="_x0000_s159873" name="Equation" r:id="rId7" imgW="1346200" imgH="508000" progId="Equation.DSMT4">
                   <p:embed/>
                 </p:oleObj>
               </mc:Choice>
               <mc:Fallback>
-                <p:oleObj name="Equation" r:id="rId6" imgW="1346200" imgH="508000" progId="Equation.DSMT4">
+                <p:oleObj name="Equation" r:id="rId7" imgW="1346200" imgH="508000" progId="Equation.DSMT4">
                   <p:embed/>
                   <p:pic>
                     <p:nvPicPr>
@@ -10580,7 +10631,7 @@
                       <p:nvPr/>
                     </p:nvPicPr>
                     <p:blipFill>
-                      <a:blip r:embed="rId7"/>
+                      <a:blip r:embed="rId8"/>
                       <a:stretch>
                         <a:fillRect/>
                       </a:stretch>
@@ -10623,12 +10674,12 @@
           <a:graphicData uri="http://schemas.openxmlformats.org/presentationml/2006/ole">
             <mc:AlternateContent xmlns:mc="http://schemas.openxmlformats.org/markup-compatibility/2006">
               <mc:Choice xmlns:v="urn:schemas-microsoft-com:vml" Requires="v">
-                <p:oleObj spid="_x0000_s159855" name="Equation" r:id="rId8" imgW="1193800" imgH="457200" progId="Equation.DSMT4">
+                <p:oleObj spid="_x0000_s159874" name="Equation" r:id="rId9" imgW="1193800" imgH="457200" progId="Equation.DSMT4">
                   <p:embed/>
                 </p:oleObj>
               </mc:Choice>
               <mc:Fallback>
-                <p:oleObj name="Equation" r:id="rId8" imgW="1193800" imgH="457200" progId="Equation.DSMT4">
+                <p:oleObj name="Equation" r:id="rId9" imgW="1193800" imgH="457200" progId="Equation.DSMT4">
                   <p:embed/>
                   <p:pic>
                     <p:nvPicPr>
@@ -10637,7 +10688,7 @@
                       <p:nvPr/>
                     </p:nvPicPr>
                     <p:blipFill>
-                      <a:blip r:embed="rId9"/>
+                      <a:blip r:embed="rId10"/>
                       <a:stretch>
                         <a:fillRect/>
                       </a:stretch>
@@ -10659,11 +10710,14 @@
         </a:graphic>
       </p:graphicFrame>
     </p:spTree>
+    <p:custDataLst>
+      <p:tags r:id="rId2"/>
+    </p:custDataLst>
   </p:cSld>
   <p:clrMapOvr>
     <a:masterClrMapping/>
   </p:clrMapOvr>
-  <p:transition xmlns:p14="http://schemas.microsoft.com/office/powerpoint/2010/main">
+  <p:transition xmlns:p14="http://schemas.microsoft.com/office/powerpoint/2010/main" advTm="14584">
     <p:fade/>
   </p:transition>
   <p:timing>
@@ -10944,12 +10998,12 @@
           <a:graphicData uri="http://schemas.openxmlformats.org/presentationml/2006/ole">
             <mc:AlternateContent xmlns:mc="http://schemas.openxmlformats.org/markup-compatibility/2006">
               <mc:Choice xmlns:v="urn:schemas-microsoft-com:vml" Requires="v">
-                <p:oleObj spid="_x0000_s160936" name="Equation" r:id="rId4" imgW="558800" imgH="266700" progId="Equation.DSMT4">
+                <p:oleObj spid="_x0000_s160972" name="Equation" r:id="rId5" imgW="558800" imgH="266700" progId="Equation.DSMT4">
                   <p:embed/>
                 </p:oleObj>
               </mc:Choice>
               <mc:Fallback>
-                <p:oleObj name="Equation" r:id="rId4" imgW="558800" imgH="266700" progId="Equation.DSMT4">
+                <p:oleObj name="Equation" r:id="rId5" imgW="558800" imgH="266700" progId="Equation.DSMT4">
                   <p:embed/>
                   <p:pic>
                     <p:nvPicPr>
@@ -10960,7 +11014,7 @@
                       <p:nvPr/>
                     </p:nvPicPr>
                     <p:blipFill>
-                      <a:blip r:embed="rId5"/>
+                      <a:blip r:embed="rId6"/>
                       <a:srcRect/>
                       <a:stretch>
                         <a:fillRect/>
@@ -11008,12 +11062,12 @@
           <a:graphicData uri="http://schemas.openxmlformats.org/presentationml/2006/ole">
             <mc:AlternateContent xmlns:mc="http://schemas.openxmlformats.org/markup-compatibility/2006">
               <mc:Choice xmlns:v="urn:schemas-microsoft-com:vml" Requires="v">
-                <p:oleObj spid="_x0000_s160937" name="Equation" r:id="rId6" imgW="114120" imgH="215640" progId="Equation.3">
+                <p:oleObj spid="_x0000_s160973" name="Equation" r:id="rId7" imgW="114120" imgH="215640" progId="Equation.3">
                   <p:embed/>
                 </p:oleObj>
               </mc:Choice>
               <mc:Fallback>
-                <p:oleObj name="Equation" r:id="rId6" imgW="114120" imgH="215640" progId="Equation.3">
+                <p:oleObj name="Equation" r:id="rId7" imgW="114120" imgH="215640" progId="Equation.3">
                   <p:embed/>
                   <p:pic>
                     <p:nvPicPr>
@@ -11024,7 +11078,7 @@
                       <p:nvPr/>
                     </p:nvPicPr>
                     <p:blipFill>
-                      <a:blip r:embed="rId7">
+                      <a:blip r:embed="rId8">
                         <a:extLst>
                           <a:ext uri="{28A0092B-C50C-407E-A947-70E740481C1C}">
                             <a14:useLocalDpi xmlns:a14="http://schemas.microsoft.com/office/drawing/2010/main" val="0"/>
@@ -11084,12 +11138,12 @@
           <a:graphicData uri="http://schemas.openxmlformats.org/presentationml/2006/ole">
             <mc:AlternateContent xmlns:mc="http://schemas.openxmlformats.org/markup-compatibility/2006">
               <mc:Choice xmlns:v="urn:schemas-microsoft-com:vml" Requires="v">
-                <p:oleObj spid="_x0000_s160938" name="Equation" r:id="rId8" imgW="762000" imgH="431800" progId="Equation.DSMT4">
+                <p:oleObj spid="_x0000_s160974" name="Equation" r:id="rId9" imgW="762000" imgH="431800" progId="Equation.DSMT4">
                   <p:embed/>
                 </p:oleObj>
               </mc:Choice>
               <mc:Fallback>
-                <p:oleObj name="Equation" r:id="rId8" imgW="762000" imgH="431800" progId="Equation.DSMT4">
+                <p:oleObj name="Equation" r:id="rId9" imgW="762000" imgH="431800" progId="Equation.DSMT4">
                   <p:embed/>
                   <p:pic>
                     <p:nvPicPr>
@@ -11100,7 +11154,7 @@
                       <p:nvPr/>
                     </p:nvPicPr>
                     <p:blipFill>
-                      <a:blip r:embed="rId9"/>
+                      <a:blip r:embed="rId10"/>
                       <a:srcRect/>
                       <a:stretch>
                         <a:fillRect/>
@@ -11154,12 +11208,12 @@
           <a:graphicData uri="http://schemas.openxmlformats.org/presentationml/2006/ole">
             <mc:AlternateContent xmlns:mc="http://schemas.openxmlformats.org/markup-compatibility/2006">
               <mc:Choice xmlns:v="urn:schemas-microsoft-com:vml" Requires="v">
-                <p:oleObj spid="_x0000_s160939" name="Equation" r:id="rId10" imgW="1117600" imgH="431800" progId="Equation.DSMT4">
+                <p:oleObj spid="_x0000_s160975" name="Equation" r:id="rId11" imgW="1117600" imgH="431800" progId="Equation.DSMT4">
                   <p:embed/>
                 </p:oleObj>
               </mc:Choice>
               <mc:Fallback>
-                <p:oleObj name="Equation" r:id="rId10" imgW="1117600" imgH="431800" progId="Equation.DSMT4">
+                <p:oleObj name="Equation" r:id="rId11" imgW="1117600" imgH="431800" progId="Equation.DSMT4">
                   <p:embed/>
                   <p:pic>
                     <p:nvPicPr>
@@ -11170,7 +11224,7 @@
                       <p:nvPr/>
                     </p:nvPicPr>
                     <p:blipFill>
-                      <a:blip r:embed="rId11"/>
+                      <a:blip r:embed="rId12"/>
                       <a:srcRect/>
                       <a:stretch>
                         <a:fillRect/>
@@ -11392,11 +11446,11 @@
           <a:p>
             <a:pPr eaLnBrk="1" hangingPunct="1"/>
             <a:r>
-              <a:rPr lang="en-US" smtClean="0"/>
+              <a:rPr lang="en-US" dirty="0" smtClean="0"/>
               <a:t>Little Oh:   </a:t>
             </a:r>
             <a:r>
-              <a:rPr lang="en-US" smtClean="0">
+              <a:rPr lang="en-US" dirty="0" smtClean="0">
                 <a:solidFill>
                   <a:srgbClr val="FF33CC"/>
                 </a:solidFill>
@@ -11428,12 +11482,12 @@
           <a:graphicData uri="http://schemas.openxmlformats.org/presentationml/2006/ole">
             <mc:AlternateContent xmlns:mc="http://schemas.openxmlformats.org/markup-compatibility/2006">
               <mc:Choice xmlns:v="urn:schemas-microsoft-com:vml" Requires="v">
-                <p:oleObj spid="_x0000_s160940" name="Equation" r:id="rId12" imgW="622300" imgH="469900" progId="Equation.DSMT4">
+                <p:oleObj spid="_x0000_s160976" name="Equation" r:id="rId13" imgW="622300" imgH="469900" progId="Equation.DSMT4">
                   <p:embed/>
                 </p:oleObj>
               </mc:Choice>
               <mc:Fallback>
-                <p:oleObj name="Equation" r:id="rId12" imgW="622300" imgH="469900" progId="Equation.DSMT4">
+                <p:oleObj name="Equation" r:id="rId13" imgW="622300" imgH="469900" progId="Equation.DSMT4">
                   <p:embed/>
                   <p:pic>
                     <p:nvPicPr>
@@ -11442,7 +11496,7 @@
                       <p:nvPr/>
                     </p:nvPicPr>
                     <p:blipFill>
-                      <a:blip r:embed="rId13"/>
+                      <a:blip r:embed="rId14"/>
                       <a:stretch>
                         <a:fillRect/>
                       </a:stretch>
@@ -11649,7 +11703,7 @@
             <a:r>
               <a:rPr lang="en-US" sz="4400" dirty="0" err="1" smtClean="0">
                 <a:solidFill>
-                  <a:srgbClr val="0033CC"/>
+                  <a:srgbClr val="0000FF"/>
                 </a:solidFill>
               </a:rPr>
               <a:t>ln</a:t>
@@ -11657,7 +11711,7 @@
             <a:r>
               <a:rPr lang="en-US" sz="4400" dirty="0" smtClean="0">
                 <a:solidFill>
-                  <a:srgbClr val="0033CC"/>
+                  <a:srgbClr val="0000FF"/>
                 </a:solidFill>
               </a:rPr>
               <a:t> x  </a:t>
@@ -11665,7 +11719,7 @@
             <a:r>
               <a:rPr lang="en-US" sz="4400" b="1" dirty="0" smtClean="0">
                 <a:solidFill>
-                  <a:srgbClr val="0033CC"/>
+                  <a:srgbClr val="0000FF"/>
                 </a:solidFill>
                 <a:latin typeface="Euclid Symbol" charset="2"/>
                 <a:cs typeface="Euclid Symbol" charset="2"/>
@@ -11675,7 +11729,7 @@
             <a:r>
               <a:rPr lang="en-US" sz="4400" dirty="0" smtClean="0">
                 <a:solidFill>
-                  <a:srgbClr val="0033CC"/>
+                  <a:srgbClr val="0000FF"/>
                 </a:solidFill>
               </a:rPr>
               <a:t> o(</a:t>
@@ -11683,7 +11737,7 @@
             <a:r>
               <a:rPr lang="en-US" sz="4400" dirty="0" err="1" smtClean="0">
                 <a:solidFill>
-                  <a:srgbClr val="0033CC"/>
+                  <a:srgbClr val="0000FF"/>
                 </a:solidFill>
               </a:rPr>
               <a:t>x</a:t>
@@ -11691,7 +11745,7 @@
             <a:r>
               <a:rPr lang="en-US" sz="4400" baseline="30000" dirty="0" err="1" smtClean="0">
                 <a:solidFill>
-                  <a:srgbClr val="0033CC"/>
+                  <a:srgbClr val="0000FF"/>
                 </a:solidFill>
                 <a:sym typeface="Symbol" pitchFamily="18" charset="2"/>
               </a:rPr>
@@ -11700,7 +11754,7 @@
             <a:r>
               <a:rPr lang="en-US" sz="4400" dirty="0" smtClean="0">
                 <a:solidFill>
-                  <a:srgbClr val="0033CC"/>
+                  <a:srgbClr val="0000FF"/>
                 </a:solidFill>
               </a:rPr>
               <a:t>)</a:t>
@@ -11761,11 +11815,14 @@
         </p:txBody>
       </p:sp>
     </p:spTree>
+    <p:custDataLst>
+      <p:tags r:id="rId2"/>
+    </p:custDataLst>
   </p:cSld>
   <p:clrMapOvr>
     <a:masterClrMapping/>
   </p:clrMapOvr>
-  <p:transition xmlns:p14="http://schemas.microsoft.com/office/powerpoint/2010/main">
+  <p:transition xmlns:p14="http://schemas.microsoft.com/office/powerpoint/2010/main" advTm="13106">
     <p:fade/>
   </p:transition>
   <p:timing>
@@ -12270,11 +12327,14 @@
         </p:txBody>
       </p:sp>
     </p:spTree>
+    <p:custDataLst>
+      <p:tags r:id="rId1"/>
+    </p:custDataLst>
   </p:cSld>
   <p:clrMapOvr>
     <a:masterClrMapping/>
   </p:clrMapOvr>
-  <p:transition xmlns:p14="http://schemas.microsoft.com/office/powerpoint/2010/main" spd="slow">
+  <p:transition xmlns:p14="http://schemas.microsoft.com/office/powerpoint/2010/main" spd="slow" advTm="6144">
     <p:fade thruBlk="1"/>
   </p:transition>
   <p:timing>
@@ -12385,6 +12445,66 @@
   <p:tag name="DEFAULTFONTSIZE" val="10"/>
   <p:tag name="DEFAULTWIDTH" val="446"/>
   <p:tag name="DEFAULTHEIGHT" val="328"/>
+</p:tagLst>
+</file>
+
+<file path=ppt/tags/tag10.xml><?xml version="1.0" encoding="utf-8"?>
+<p:tagLst xmlns:a="http://schemas.openxmlformats.org/drawingml/2006/main" xmlns:r="http://schemas.openxmlformats.org/officeDocument/2006/relationships" xmlns:p="http://schemas.openxmlformats.org/presentationml/2006/main">
+  <p:tag name="TIMING" val="|2.9|2.3|8.8|3|2.8"/>
+</p:tagLst>
+</file>
+
+<file path=ppt/tags/tag11.xml><?xml version="1.0" encoding="utf-8"?>
+<p:tagLst xmlns:a="http://schemas.openxmlformats.org/drawingml/2006/main" xmlns:r="http://schemas.openxmlformats.org/officeDocument/2006/relationships" xmlns:p="http://schemas.openxmlformats.org/presentationml/2006/main">
+  <p:tag name="TIMING" val="|1.8|7.6|4.7|8.6|1.5"/>
+</p:tagLst>
+</file>
+
+<file path=ppt/tags/tag2.xml><?xml version="1.0" encoding="utf-8"?>
+<p:tagLst xmlns:a="http://schemas.openxmlformats.org/drawingml/2006/main" xmlns:r="http://schemas.openxmlformats.org/officeDocument/2006/relationships" xmlns:p="http://schemas.openxmlformats.org/presentationml/2006/main">
+  <p:tag name="TIMING" val="|9|2.3|2.7"/>
+</p:tagLst>
+</file>
+
+<file path=ppt/tags/tag3.xml><?xml version="1.0" encoding="utf-8"?>
+<p:tagLst xmlns:a="http://schemas.openxmlformats.org/drawingml/2006/main" xmlns:r="http://schemas.openxmlformats.org/officeDocument/2006/relationships" xmlns:p="http://schemas.openxmlformats.org/presentationml/2006/main">
+  <p:tag name="TIMING" val="|3|2"/>
+</p:tagLst>
+</file>
+
+<file path=ppt/tags/tag4.xml><?xml version="1.0" encoding="utf-8"?>
+<p:tagLst xmlns:a="http://schemas.openxmlformats.org/drawingml/2006/main" xmlns:r="http://schemas.openxmlformats.org/officeDocument/2006/relationships" xmlns:p="http://schemas.openxmlformats.org/presentationml/2006/main">
+  <p:tag name="TIMING" val="|4.6|3.6"/>
+</p:tagLst>
+</file>
+
+<file path=ppt/tags/tag5.xml><?xml version="1.0" encoding="utf-8"?>
+<p:tagLst xmlns:a="http://schemas.openxmlformats.org/drawingml/2006/main" xmlns:r="http://schemas.openxmlformats.org/officeDocument/2006/relationships" xmlns:p="http://schemas.openxmlformats.org/presentationml/2006/main">
+  <p:tag name="TIMING" val="|3.2"/>
+</p:tagLst>
+</file>
+
+<file path=ppt/tags/tag6.xml><?xml version="1.0" encoding="utf-8"?>
+<p:tagLst xmlns:a="http://schemas.openxmlformats.org/drawingml/2006/main" xmlns:r="http://schemas.openxmlformats.org/officeDocument/2006/relationships" xmlns:p="http://schemas.openxmlformats.org/presentationml/2006/main">
+  <p:tag name="TIMING" val="|3.4|2.8|5.4"/>
+</p:tagLst>
+</file>
+
+<file path=ppt/tags/tag7.xml><?xml version="1.0" encoding="utf-8"?>
+<p:tagLst xmlns:a="http://schemas.openxmlformats.org/drawingml/2006/main" xmlns:r="http://schemas.openxmlformats.org/officeDocument/2006/relationships" xmlns:p="http://schemas.openxmlformats.org/presentationml/2006/main">
+  <p:tag name="TIMING" val="|2|3.5|2.1"/>
+</p:tagLst>
+</file>
+
+<file path=ppt/tags/tag8.xml><?xml version="1.0" encoding="utf-8"?>
+<p:tagLst xmlns:a="http://schemas.openxmlformats.org/drawingml/2006/main" xmlns:r="http://schemas.openxmlformats.org/officeDocument/2006/relationships" xmlns:p="http://schemas.openxmlformats.org/presentationml/2006/main">
+  <p:tag name="TIMING" val="|4.3"/>
+</p:tagLst>
+</file>
+
+<file path=ppt/tags/tag9.xml><?xml version="1.0" encoding="utf-8"?>
+<p:tagLst xmlns:a="http://schemas.openxmlformats.org/drawingml/2006/main" xmlns:r="http://schemas.openxmlformats.org/officeDocument/2006/relationships" xmlns:p="http://schemas.openxmlformats.org/presentationml/2006/main">
+  <p:tag name="TIMING" val="|4.5"/>
 </p:tagLst>
 </file>
 

</xml_diff>